<commit_message>
The powerpoint we used on the presentation
Did some small corrections I forgot to push.
</commit_message>
<xml_diff>
--- a/Dokument/Halvtidspresentation/DSLsofMath.pptx
+++ b/Dokument/Halvtidspresentation/DSLsofMath.pptx
@@ -171,7 +171,6 @@
           </a:p>
         </c:rich>
       </c:tx>
-      <c:layout/>
       <c:overlay val="0"/>
       <c:spPr>
         <a:noFill/>
@@ -299,24 +298,11 @@
           <c:dLbls>
             <c:dLbl>
               <c:idx val="0"/>
-              <c:layout/>
               <c:tx>
                 <c:rich>
-                  <a:bodyPr rot="0" spcFirstLastPara="1" vertOverflow="ellipsis" vert="horz" wrap="square" lIns="38100" tIns="19050" rIns="38100" bIns="19050" anchor="ctr" anchorCtr="1">
-                    <a:spAutoFit/>
-                  </a:bodyPr>
+                  <a:bodyPr/>
                   <a:lstStyle/>
                   <a:p>
-                    <a:pPr>
-                      <a:defRPr sz="1400" b="1" i="0" u="none" strike="noStrike" kern="1200" baseline="0">
-                        <a:solidFill>
-                          <a:schemeClr val="tx1"/>
-                        </a:solidFill>
-                        <a:latin typeface="+mn-lt"/>
-                        <a:ea typeface="+mn-ea"/>
-                        <a:cs typeface="+mn-cs"/>
-                      </a:defRPr>
-                    </a:pPr>
                     <a:r>
                       <a:rPr lang="en-US" sz="1400" b="1">
                         <a:solidFill>
@@ -327,58 +313,19 @@
                     </a:r>
                   </a:p>
                   <a:p>
-                    <a:pPr>
-                      <a:defRPr sz="1400" b="1">
-                        <a:solidFill>
-                          <a:schemeClr val="tx1"/>
-                        </a:solidFill>
-                      </a:defRPr>
-                    </a:pPr>
                     <a:fld id="{FE74F4E9-206A-4A11-A159-4F4A16622E8B}" type="PERCENTAGE">
                       <a:rPr lang="en-US" sz="1400" b="1">
                         <a:solidFill>
                           <a:schemeClr val="tx1"/>
                         </a:solidFill>
                       </a:rPr>
-                      <a:pPr>
-                        <a:defRPr sz="1400" b="1">
-                          <a:solidFill>
-                            <a:schemeClr val="tx1"/>
-                          </a:solidFill>
-                        </a:defRPr>
-                      </a:pPr>
+                      <a:pPr/>
                       <a:t>[PROCENT]</a:t>
                     </a:fld>
                     <a:endParaRPr lang="sv-SE"/>
                   </a:p>
                 </c:rich>
               </c:tx>
-              <c:spPr>
-                <a:noFill/>
-                <a:ln>
-                  <a:noFill/>
-                </a:ln>
-                <a:effectLst/>
-              </c:spPr>
-              <c:txPr>
-                <a:bodyPr rot="0" spcFirstLastPara="1" vertOverflow="ellipsis" vert="horz" wrap="square" lIns="38100" tIns="19050" rIns="38100" bIns="19050" anchor="ctr" anchorCtr="1">
-                  <a:spAutoFit/>
-                </a:bodyPr>
-                <a:lstStyle/>
-                <a:p>
-                  <a:pPr>
-                    <a:defRPr sz="1400" b="1" i="0" u="none" strike="noStrike" kern="1200" baseline="0">
-                      <a:solidFill>
-                        <a:schemeClr val="tx1"/>
-                      </a:solidFill>
-                      <a:latin typeface="+mn-lt"/>
-                      <a:ea typeface="+mn-ea"/>
-                      <a:cs typeface="+mn-cs"/>
-                    </a:defRPr>
-                  </a:pPr>
-                  <a:endParaRPr lang="sv-SE"/>
-                </a:p>
-              </c:txPr>
               <c:dLblPos val="inEnd"/>
               <c:showLegendKey val="0"/>
               <c:showVal val="0"/>
@@ -388,47 +335,10 @@
               <c:showBubbleSize val="0"/>
               <c:extLst>
                 <c:ext xmlns:c15="http://schemas.microsoft.com/office/drawing/2012/chart" uri="{CE6537A1-D6FC-4f65-9D91-7224C49458BB}">
-                  <c15:layout/>
                   <c15:dlblFieldTable/>
                   <c15:showDataLabelsRange val="0"/>
                 </c:ext>
               </c:extLst>
-            </c:dLbl>
-            <c:dLbl>
-              <c:idx val="1"/>
-              <c:spPr>
-                <a:noFill/>
-                <a:ln>
-                  <a:noFill/>
-                </a:ln>
-                <a:effectLst/>
-              </c:spPr>
-              <c:txPr>
-                <a:bodyPr rot="0" spcFirstLastPara="1" vertOverflow="ellipsis" vert="horz" wrap="square" lIns="38100" tIns="19050" rIns="38100" bIns="19050" anchor="ctr" anchorCtr="1">
-                  <a:spAutoFit/>
-                </a:bodyPr>
-                <a:lstStyle/>
-                <a:p>
-                  <a:pPr>
-                    <a:defRPr sz="1400" b="1" i="0" u="none" strike="noStrike" kern="1200" baseline="0">
-                      <a:solidFill>
-                        <a:schemeClr val="tx1"/>
-                      </a:solidFill>
-                      <a:latin typeface="+mn-lt"/>
-                      <a:ea typeface="+mn-ea"/>
-                      <a:cs typeface="+mn-cs"/>
-                    </a:defRPr>
-                  </a:pPr>
-                  <a:endParaRPr lang="sv-SE"/>
-                </a:p>
-              </c:txPr>
-              <c:dLblPos val="inEnd"/>
-              <c:showLegendKey val="0"/>
-              <c:showVal val="0"/>
-              <c:showCatName val="1"/>
-              <c:showSerName val="0"/>
-              <c:showPercent val="1"/>
-              <c:showBubbleSize val="0"/>
             </c:dLbl>
             <c:spPr>
               <a:noFill/>
@@ -479,9 +389,7 @@
               </c:spPr>
             </c:leaderLines>
             <c:extLst>
-              <c:ext xmlns:c15="http://schemas.microsoft.com/office/drawing/2012/chart" uri="{CE6537A1-D6FC-4f65-9D91-7224C49458BB}">
-                <c15:layout/>
-              </c:ext>
+              <c:ext xmlns:c15="http://schemas.microsoft.com/office/drawing/2012/chart" uri="{CE6537A1-D6FC-4f65-9D91-7224C49458BB}"/>
             </c:extLst>
           </c:dLbls>
           <c:cat>
@@ -602,7 +510,6 @@
           </a:p>
         </c:rich>
       </c:tx>
-      <c:layout/>
       <c:overlay val="0"/>
       <c:spPr>
         <a:noFill/>
@@ -794,78 +701,6 @@
             </c:spPr>
           </c:dPt>
           <c:dLbls>
-            <c:dLbl>
-              <c:idx val="0"/>
-              <c:spPr>
-                <a:noFill/>
-                <a:ln>
-                  <a:noFill/>
-                </a:ln>
-                <a:effectLst/>
-              </c:spPr>
-              <c:txPr>
-                <a:bodyPr rot="0" spcFirstLastPara="1" vertOverflow="ellipsis" vert="horz" wrap="square" lIns="38100" tIns="19050" rIns="38100" bIns="19050" anchor="ctr" anchorCtr="1">
-                  <a:spAutoFit/>
-                </a:bodyPr>
-                <a:lstStyle/>
-                <a:p>
-                  <a:pPr>
-                    <a:defRPr sz="1400" b="1" i="0" u="none" strike="noStrike" kern="1200" baseline="0">
-                      <a:solidFill>
-                        <a:schemeClr val="tx1"/>
-                      </a:solidFill>
-                      <a:latin typeface="+mn-lt"/>
-                      <a:ea typeface="+mn-ea"/>
-                      <a:cs typeface="+mn-cs"/>
-                    </a:defRPr>
-                  </a:pPr>
-                  <a:endParaRPr lang="sv-SE"/>
-                </a:p>
-              </c:txPr>
-              <c:dLblPos val="inEnd"/>
-              <c:showLegendKey val="0"/>
-              <c:showVal val="0"/>
-              <c:showCatName val="1"/>
-              <c:showSerName val="0"/>
-              <c:showPercent val="1"/>
-              <c:showBubbleSize val="0"/>
-            </c:dLbl>
-            <c:dLbl>
-              <c:idx val="1"/>
-              <c:spPr>
-                <a:noFill/>
-                <a:ln>
-                  <a:noFill/>
-                </a:ln>
-                <a:effectLst/>
-              </c:spPr>
-              <c:txPr>
-                <a:bodyPr rot="0" spcFirstLastPara="1" vertOverflow="ellipsis" vert="horz" wrap="square" lIns="38100" tIns="19050" rIns="38100" bIns="19050" anchor="ctr" anchorCtr="1">
-                  <a:spAutoFit/>
-                </a:bodyPr>
-                <a:lstStyle/>
-                <a:p>
-                  <a:pPr>
-                    <a:defRPr sz="1400" b="1" i="0" u="none" strike="noStrike" kern="1200" baseline="0">
-                      <a:solidFill>
-                        <a:schemeClr val="tx1"/>
-                      </a:solidFill>
-                      <a:latin typeface="+mn-lt"/>
-                      <a:ea typeface="+mn-ea"/>
-                      <a:cs typeface="+mn-cs"/>
-                    </a:defRPr>
-                  </a:pPr>
-                  <a:endParaRPr lang="sv-SE"/>
-                </a:p>
-              </c:txPr>
-              <c:dLblPos val="inEnd"/>
-              <c:showLegendKey val="0"/>
-              <c:showVal val="0"/>
-              <c:showCatName val="1"/>
-              <c:showSerName val="0"/>
-              <c:showPercent val="1"/>
-              <c:showBubbleSize val="0"/>
-            </c:dLbl>
             <c:spPr>
               <a:noFill/>
               <a:ln>
@@ -901,9 +736,7 @@
             <c:showBubbleSize val="0"/>
             <c:showLeaderLines val="0"/>
             <c:extLst>
-              <c:ext xmlns:c15="http://schemas.microsoft.com/office/drawing/2012/chart" uri="{CE6537A1-D6FC-4f65-9D91-7224C49458BB}">
-                <c15:layout/>
-              </c:ext>
+              <c:ext xmlns:c15="http://schemas.microsoft.com/office/drawing/2012/chart" uri="{CE6537A1-D6FC-4f65-9D91-7224C49458BB}"/>
             </c:extLst>
           </c:dLbls>
           <c:cat>
@@ -998,7 +831,6 @@
   </mc:AlternateContent>
   <c:chart>
     <c:title>
-      <c:layout/>
       <c:overlay val="0"/>
       <c:spPr>
         <a:noFill/>
@@ -1223,9 +1055,7 @@
               </c:spPr>
             </c:leaderLines>
             <c:extLst>
-              <c:ext xmlns:c15="http://schemas.microsoft.com/office/drawing/2012/chart" uri="{CE6537A1-D6FC-4f65-9D91-7224C49458BB}">
-                <c15:layout/>
-              </c:ext>
+              <c:ext xmlns:c15="http://schemas.microsoft.com/office/drawing/2012/chart" uri="{CE6537A1-D6FC-4f65-9D91-7224C49458BB}"/>
             </c:extLst>
           </c:dLbls>
           <c:cat>
@@ -3023,7 +2853,7 @@
           <a:p>
             <a:fld id="{92A3465A-3AD9-49C2-A53A-6DC66D83CBFC}" type="datetimeFigureOut">
               <a:rPr lang="sv-SE" smtClean="0"/>
-              <a:t>2016-02-29</a:t>
+              <a:t>2016-03-01</a:t>
             </a:fld>
             <a:endParaRPr lang="sv-SE"/>
           </a:p>
@@ -3197,7 +3027,7 @@
           <a:p>
             <a:fld id="{B6D4FE38-2602-4213-8EC0-D519448B5F8D}" type="datetimeFigureOut">
               <a:rPr lang="sv-SE" smtClean="0"/>
-              <a:t>2016-02-29</a:t>
+              <a:t>2016-03-01</a:t>
             </a:fld>
             <a:endParaRPr lang="sv-SE"/>
           </a:p>
@@ -3826,7 +3656,7 @@
           <a:p>
             <a:fld id="{B22F029A-C8A8-405B-BFC7-FDD186554002}" type="datetimeFigureOut">
               <a:rPr lang="sv-SE" smtClean="0"/>
-              <a:t>2016-02-29</a:t>
+              <a:t>2016-03-01</a:t>
             </a:fld>
             <a:endParaRPr lang="sv-SE"/>
           </a:p>
@@ -3996,7 +3826,7 @@
           <a:p>
             <a:fld id="{B22F029A-C8A8-405B-BFC7-FDD186554002}" type="datetimeFigureOut">
               <a:rPr lang="sv-SE" smtClean="0"/>
-              <a:t>2016-02-29</a:t>
+              <a:t>2016-03-01</a:t>
             </a:fld>
             <a:endParaRPr lang="sv-SE"/>
           </a:p>
@@ -4176,7 +4006,7 @@
           <a:p>
             <a:fld id="{B22F029A-C8A8-405B-BFC7-FDD186554002}" type="datetimeFigureOut">
               <a:rPr lang="sv-SE" smtClean="0"/>
-              <a:t>2016-02-29</a:t>
+              <a:t>2016-03-01</a:t>
             </a:fld>
             <a:endParaRPr lang="sv-SE"/>
           </a:p>
@@ -4379,7 +4209,7 @@
           <a:p>
             <a:fld id="{B22F029A-C8A8-405B-BFC7-FDD186554002}" type="datetimeFigureOut">
               <a:rPr lang="sv-SE" smtClean="0"/>
-              <a:t>2016-02-29</a:t>
+              <a:t>2016-03-01</a:t>
             </a:fld>
             <a:endParaRPr lang="sv-SE"/>
           </a:p>
@@ -4549,7 +4379,7 @@
           <a:p>
             <a:fld id="{B22F029A-C8A8-405B-BFC7-FDD186554002}" type="datetimeFigureOut">
               <a:rPr lang="sv-SE" smtClean="0"/>
-              <a:t>2016-02-29</a:t>
+              <a:t>2016-03-01</a:t>
             </a:fld>
             <a:endParaRPr lang="sv-SE"/>
           </a:p>
@@ -4800,7 +4630,7 @@
           <a:p>
             <a:fld id="{B22F029A-C8A8-405B-BFC7-FDD186554002}" type="datetimeFigureOut">
               <a:rPr lang="sv-SE" smtClean="0"/>
-              <a:t>2016-02-29</a:t>
+              <a:t>2016-03-01</a:t>
             </a:fld>
             <a:endParaRPr lang="sv-SE"/>
           </a:p>
@@ -5032,7 +4862,7 @@
           <a:p>
             <a:fld id="{B22F029A-C8A8-405B-BFC7-FDD186554002}" type="datetimeFigureOut">
               <a:rPr lang="sv-SE" smtClean="0"/>
-              <a:t>2016-02-29</a:t>
+              <a:t>2016-03-01</a:t>
             </a:fld>
             <a:endParaRPr lang="sv-SE"/>
           </a:p>
@@ -5379,7 +5209,7 @@
           <a:p>
             <a:fld id="{B22F029A-C8A8-405B-BFC7-FDD186554002}" type="datetimeFigureOut">
               <a:rPr lang="sv-SE" smtClean="0"/>
-              <a:t>2016-02-29</a:t>
+              <a:t>2016-03-01</a:t>
             </a:fld>
             <a:endParaRPr lang="sv-SE"/>
           </a:p>
@@ -5497,7 +5327,7 @@
           <a:p>
             <a:fld id="{B22F029A-C8A8-405B-BFC7-FDD186554002}" type="datetimeFigureOut">
               <a:rPr lang="sv-SE" smtClean="0"/>
-              <a:t>2016-02-29</a:t>
+              <a:t>2016-03-01</a:t>
             </a:fld>
             <a:endParaRPr lang="sv-SE"/>
           </a:p>
@@ -5615,7 +5445,7 @@
           <a:p>
             <a:fld id="{B22F029A-C8A8-405B-BFC7-FDD186554002}" type="datetimeFigureOut">
               <a:rPr lang="sv-SE" smtClean="0"/>
-              <a:t>2016-02-29</a:t>
+              <a:t>2016-03-01</a:t>
             </a:fld>
             <a:endParaRPr lang="sv-SE"/>
           </a:p>
@@ -5899,7 +5729,7 @@
           <a:p>
             <a:fld id="{B22F029A-C8A8-405B-BFC7-FDD186554002}" type="datetimeFigureOut">
               <a:rPr lang="sv-SE" smtClean="0"/>
-              <a:t>2016-02-29</a:t>
+              <a:t>2016-03-01</a:t>
             </a:fld>
             <a:endParaRPr lang="sv-SE"/>
           </a:p>
@@ -6069,7 +5899,7 @@
           <a:p>
             <a:fld id="{B22F029A-C8A8-405B-BFC7-FDD186554002}" type="datetimeFigureOut">
               <a:rPr lang="sv-SE" smtClean="0"/>
-              <a:t>2016-02-29</a:t>
+              <a:t>2016-03-01</a:t>
             </a:fld>
             <a:endParaRPr lang="sv-SE"/>
           </a:p>
@@ -6333,7 +6163,7 @@
           <a:p>
             <a:fld id="{B22F029A-C8A8-405B-BFC7-FDD186554002}" type="datetimeFigureOut">
               <a:rPr lang="sv-SE" smtClean="0"/>
-              <a:t>2016-02-29</a:t>
+              <a:t>2016-03-01</a:t>
             </a:fld>
             <a:endParaRPr lang="sv-SE"/>
           </a:p>
@@ -6503,7 +6333,7 @@
           <a:p>
             <a:fld id="{B22F029A-C8A8-405B-BFC7-FDD186554002}" type="datetimeFigureOut">
               <a:rPr lang="sv-SE" smtClean="0"/>
-              <a:t>2016-02-29</a:t>
+              <a:t>2016-03-01</a:t>
             </a:fld>
             <a:endParaRPr lang="sv-SE"/>
           </a:p>
@@ -6683,7 +6513,7 @@
           <a:p>
             <a:fld id="{B22F029A-C8A8-405B-BFC7-FDD186554002}" type="datetimeFigureOut">
               <a:rPr lang="sv-SE" smtClean="0"/>
-              <a:t>2016-02-29</a:t>
+              <a:t>2016-03-01</a:t>
             </a:fld>
             <a:endParaRPr lang="sv-SE"/>
           </a:p>
@@ -7075,7 +6905,7 @@
           <a:p>
             <a:fld id="{B22F029A-C8A8-405B-BFC7-FDD186554002}" type="datetimeFigureOut">
               <a:rPr lang="sv-SE" smtClean="0"/>
-              <a:t>2016-02-29</a:t>
+              <a:t>2016-03-01</a:t>
             </a:fld>
             <a:endParaRPr lang="sv-SE"/>
           </a:p>
@@ -7316,7 +7146,7 @@
           <a:p>
             <a:fld id="{B22F029A-C8A8-405B-BFC7-FDD186554002}" type="datetimeFigureOut">
               <a:rPr lang="sv-SE" smtClean="0"/>
-              <a:t>2016-02-29</a:t>
+              <a:t>2016-03-01</a:t>
             </a:fld>
             <a:endParaRPr lang="sv-SE"/>
           </a:p>
@@ -7564,7 +7394,7 @@
           <a:p>
             <a:fld id="{B22F029A-C8A8-405B-BFC7-FDD186554002}" type="datetimeFigureOut">
               <a:rPr lang="sv-SE" smtClean="0"/>
-              <a:t>2016-02-29</a:t>
+              <a:t>2016-03-01</a:t>
             </a:fld>
             <a:endParaRPr lang="sv-SE"/>
           </a:p>
@@ -7862,7 +7692,7 @@
           <a:p>
             <a:fld id="{B22F029A-C8A8-405B-BFC7-FDD186554002}" type="datetimeFigureOut">
               <a:rPr lang="sv-SE" smtClean="0"/>
-              <a:t>2016-02-29</a:t>
+              <a:t>2016-03-01</a:t>
             </a:fld>
             <a:endParaRPr lang="sv-SE"/>
           </a:p>
@@ -8256,7 +8086,7 @@
           <a:p>
             <a:fld id="{B22F029A-C8A8-405B-BFC7-FDD186554002}" type="datetimeFigureOut">
               <a:rPr lang="sv-SE" smtClean="0"/>
-              <a:t>2016-02-29</a:t>
+              <a:t>2016-03-01</a:t>
             </a:fld>
             <a:endParaRPr lang="sv-SE"/>
           </a:p>
@@ -8405,7 +8235,7 @@
           <a:p>
             <a:fld id="{B22F029A-C8A8-405B-BFC7-FDD186554002}" type="datetimeFigureOut">
               <a:rPr lang="sv-SE" smtClean="0"/>
-              <a:t>2016-02-29</a:t>
+              <a:t>2016-03-01</a:t>
             </a:fld>
             <a:endParaRPr lang="sv-SE"/>
           </a:p>
@@ -8531,7 +8361,7 @@
           <a:p>
             <a:fld id="{B22F029A-C8A8-405B-BFC7-FDD186554002}" type="datetimeFigureOut">
               <a:rPr lang="sv-SE" smtClean="0"/>
-              <a:t>2016-02-29</a:t>
+              <a:t>2016-03-01</a:t>
             </a:fld>
             <a:endParaRPr lang="sv-SE"/>
           </a:p>
@@ -8782,7 +8612,7 @@
           <a:p>
             <a:fld id="{B22F029A-C8A8-405B-BFC7-FDD186554002}" type="datetimeFigureOut">
               <a:rPr lang="sv-SE" smtClean="0"/>
-              <a:t>2016-02-29</a:t>
+              <a:t>2016-03-01</a:t>
             </a:fld>
             <a:endParaRPr lang="sv-SE"/>
           </a:p>
@@ -9037,7 +8867,7 @@
           <a:p>
             <a:fld id="{B22F029A-C8A8-405B-BFC7-FDD186554002}" type="datetimeFigureOut">
               <a:rPr lang="sv-SE" smtClean="0"/>
-              <a:t>2016-02-29</a:t>
+              <a:t>2016-03-01</a:t>
             </a:fld>
             <a:endParaRPr lang="sv-SE"/>
           </a:p>
@@ -9352,7 +9182,7 @@
           <a:p>
             <a:fld id="{B22F029A-C8A8-405B-BFC7-FDD186554002}" type="datetimeFigureOut">
               <a:rPr lang="sv-SE" smtClean="0"/>
-              <a:t>2016-02-29</a:t>
+              <a:t>2016-03-01</a:t>
             </a:fld>
             <a:endParaRPr lang="sv-SE"/>
           </a:p>
@@ -9636,7 +9466,7 @@
           <a:p>
             <a:fld id="{B22F029A-C8A8-405B-BFC7-FDD186554002}" type="datetimeFigureOut">
               <a:rPr lang="sv-SE" smtClean="0"/>
-              <a:t>2016-02-29</a:t>
+              <a:t>2016-03-01</a:t>
             </a:fld>
             <a:endParaRPr lang="sv-SE"/>
           </a:p>
@@ -9884,7 +9714,7 @@
           <a:p>
             <a:fld id="{B22F029A-C8A8-405B-BFC7-FDD186554002}" type="datetimeFigureOut">
               <a:rPr lang="sv-SE" smtClean="0"/>
-              <a:t>2016-02-29</a:t>
+              <a:t>2016-03-01</a:t>
             </a:fld>
             <a:endParaRPr lang="sv-SE"/>
           </a:p>
@@ -10223,7 +10053,7 @@
           <a:p>
             <a:fld id="{B22F029A-C8A8-405B-BFC7-FDD186554002}" type="datetimeFigureOut">
               <a:rPr lang="sv-SE" smtClean="0"/>
-              <a:t>2016-02-29</a:t>
+              <a:t>2016-03-01</a:t>
             </a:fld>
             <a:endParaRPr lang="sv-SE"/>
           </a:p>
@@ -10570,7 +10400,7 @@
           <a:p>
             <a:fld id="{B22F029A-C8A8-405B-BFC7-FDD186554002}" type="datetimeFigureOut">
               <a:rPr lang="sv-SE" smtClean="0"/>
-              <a:t>2016-02-29</a:t>
+              <a:t>2016-03-01</a:t>
             </a:fld>
             <a:endParaRPr lang="sv-SE"/>
           </a:p>
@@ -10944,7 +10774,7 @@
           <a:p>
             <a:fld id="{B22F029A-C8A8-405B-BFC7-FDD186554002}" type="datetimeFigureOut">
               <a:rPr lang="sv-SE" smtClean="0"/>
-              <a:t>2016-02-29</a:t>
+              <a:t>2016-03-01</a:t>
             </a:fld>
             <a:endParaRPr lang="sv-SE"/>
           </a:p>
@@ -11414,7 +11244,7 @@
           <a:p>
             <a:fld id="{B22F029A-C8A8-405B-BFC7-FDD186554002}" type="datetimeFigureOut">
               <a:rPr lang="sv-SE" smtClean="0"/>
-              <a:t>2016-02-29</a:t>
+              <a:t>2016-03-01</a:t>
             </a:fld>
             <a:endParaRPr lang="sv-SE"/>
           </a:p>
@@ -11619,7 +11449,7 @@
           <a:p>
             <a:fld id="{B22F029A-C8A8-405B-BFC7-FDD186554002}" type="datetimeFigureOut">
               <a:rPr lang="sv-SE" smtClean="0"/>
-              <a:t>2016-02-29</a:t>
+              <a:t>2016-03-01</a:t>
             </a:fld>
             <a:endParaRPr lang="sv-SE"/>
           </a:p>
@@ -11830,7 +11660,7 @@
           <a:p>
             <a:fld id="{B22F029A-C8A8-405B-BFC7-FDD186554002}" type="datetimeFigureOut">
               <a:rPr lang="sv-SE" smtClean="0"/>
-              <a:t>2016-02-29</a:t>
+              <a:t>2016-03-01</a:t>
             </a:fld>
             <a:endParaRPr lang="sv-SE"/>
           </a:p>
@@ -12093,7 +11923,7 @@
           <a:p>
             <a:fld id="{B22F029A-C8A8-405B-BFC7-FDD186554002}" type="datetimeFigureOut">
               <a:rPr lang="sv-SE" smtClean="0"/>
-              <a:t>2016-02-29</a:t>
+              <a:t>2016-03-01</a:t>
             </a:fld>
             <a:endParaRPr lang="sv-SE"/>
           </a:p>
@@ -12440,7 +12270,7 @@
           <a:p>
             <a:fld id="{B22F029A-C8A8-405B-BFC7-FDD186554002}" type="datetimeFigureOut">
               <a:rPr lang="sv-SE" smtClean="0"/>
-              <a:t>2016-02-29</a:t>
+              <a:t>2016-03-01</a:t>
             </a:fld>
             <a:endParaRPr lang="sv-SE"/>
           </a:p>
@@ -12558,7 +12388,7 @@
           <a:p>
             <a:fld id="{B22F029A-C8A8-405B-BFC7-FDD186554002}" type="datetimeFigureOut">
               <a:rPr lang="sv-SE" smtClean="0"/>
-              <a:t>2016-02-29</a:t>
+              <a:t>2016-03-01</a:t>
             </a:fld>
             <a:endParaRPr lang="sv-SE"/>
           </a:p>
@@ -12676,7 +12506,7 @@
           <a:p>
             <a:fld id="{B22F029A-C8A8-405B-BFC7-FDD186554002}" type="datetimeFigureOut">
               <a:rPr lang="sv-SE" smtClean="0"/>
-              <a:t>2016-02-29</a:t>
+              <a:t>2016-03-01</a:t>
             </a:fld>
             <a:endParaRPr lang="sv-SE"/>
           </a:p>
@@ -12960,7 +12790,7 @@
           <a:p>
             <a:fld id="{B22F029A-C8A8-405B-BFC7-FDD186554002}" type="datetimeFigureOut">
               <a:rPr lang="sv-SE" smtClean="0"/>
-              <a:t>2016-02-29</a:t>
+              <a:t>2016-03-01</a:t>
             </a:fld>
             <a:endParaRPr lang="sv-SE"/>
           </a:p>
@@ -13224,7 +13054,7 @@
           <a:p>
             <a:fld id="{B22F029A-C8A8-405B-BFC7-FDD186554002}" type="datetimeFigureOut">
               <a:rPr lang="sv-SE" smtClean="0"/>
-              <a:t>2016-02-29</a:t>
+              <a:t>2016-03-01</a:t>
             </a:fld>
             <a:endParaRPr lang="sv-SE"/>
           </a:p>
@@ -13438,7 +13268,7 @@
           <a:p>
             <a:fld id="{B22F029A-C8A8-405B-BFC7-FDD186554002}" type="datetimeFigureOut">
               <a:rPr lang="sv-SE" smtClean="0"/>
-              <a:t>2016-02-29</a:t>
+              <a:t>2016-03-01</a:t>
             </a:fld>
             <a:endParaRPr lang="sv-SE"/>
           </a:p>
@@ -13968,7 +13798,7 @@
           <a:p>
             <a:fld id="{B22F029A-C8A8-405B-BFC7-FDD186554002}" type="datetimeFigureOut">
               <a:rPr lang="sv-SE" smtClean="0"/>
-              <a:t>2016-02-29</a:t>
+              <a:t>2016-03-01</a:t>
             </a:fld>
             <a:endParaRPr lang="sv-SE"/>
           </a:p>
@@ -14635,7 +14465,7 @@
           <a:p>
             <a:fld id="{B22F029A-C8A8-405B-BFC7-FDD186554002}" type="datetimeFigureOut">
               <a:rPr lang="sv-SE" smtClean="0"/>
-              <a:t>2016-02-29</a:t>
+              <a:t>2016-03-01</a:t>
             </a:fld>
             <a:endParaRPr lang="sv-SE"/>
           </a:p>
@@ -15330,24 +15160,25 @@
         </p:nvSpPr>
         <p:spPr/>
         <p:txBody>
-          <a:bodyPr/>
-          <a:lstStyle/>
-          <a:p>
-            <a:r>
-              <a:rPr lang="sv-SE" sz="3600" dirty="0" smtClean="0"/>
+          <a:bodyPr>
+            <a:normAutofit/>
+          </a:bodyPr>
+          <a:lstStyle/>
+          <a:p>
+            <a:r>
+              <a:rPr lang="sv-SE" sz="4800" dirty="0" smtClean="0"/>
               <a:t>Matematikens domänspecifika språk</a:t>
             </a:r>
-            <a:endParaRPr lang="sv-SE" sz="3600" dirty="0" smtClean="0"/>
-          </a:p>
-          <a:p>
-            <a:r>
-              <a:rPr lang="sv-SE" sz="3600" dirty="0" err="1" smtClean="0"/>
+          </a:p>
+          <a:p>
+            <a:r>
+              <a:rPr lang="sv-SE" sz="4800" dirty="0" err="1" smtClean="0"/>
               <a:t>Haskell</a:t>
             </a:r>
-            <a:endParaRPr lang="sv-SE" sz="3600" dirty="0" smtClean="0"/>
-          </a:p>
-          <a:p>
-            <a:endParaRPr lang="sv-SE" dirty="0"/>
+            <a:endParaRPr lang="sv-SE" sz="4800" dirty="0" smtClean="0"/>
+          </a:p>
+          <a:p>
+            <a:endParaRPr lang="sv-SE" sz="3600" dirty="0"/>
           </a:p>
         </p:txBody>
       </p:sp>
@@ -15961,7 +15792,34 @@
             </a:pPr>
             <a:r>
               <a:rPr lang="sv-SE" sz="4400" dirty="0" smtClean="0"/>
-              <a:t>Ta gärna tag i oss i pausen om ni vill hjälpa till och ge feedback om kurserna till oss.</a:t>
+              <a:t>Ta gärna tag i oss i pausen om ni vill hjälpa till och ge feedback om kurserna till oss</a:t>
+            </a:r>
+            <a:r>
+              <a:rPr lang="sv-SE" sz="4400" dirty="0" smtClean="0"/>
+              <a:t>.</a:t>
+            </a:r>
+          </a:p>
+          <a:p>
+            <a:pPr marL="0" indent="0">
+              <a:buNone/>
+            </a:pPr>
+            <a:endParaRPr lang="sv-SE" sz="4400" smtClean="0"/>
+          </a:p>
+          <a:p>
+            <a:pPr marL="0" indent="0">
+              <a:buNone/>
+            </a:pPr>
+            <a:r>
+              <a:rPr lang="sv-SE" sz="4400" smtClean="0"/>
+              <a:t>t</a:t>
+            </a:r>
+            <a:r>
+              <a:rPr lang="sv-SE" sz="4400" smtClean="0"/>
+              <a:t>inyurl.com/</a:t>
+            </a:r>
+            <a:r>
+              <a:rPr lang="sv-SE" sz="4400" dirty="0" err="1" smtClean="0"/>
+              <a:t>DSLsofMath</a:t>
             </a:r>
             <a:endParaRPr lang="sv-SE" sz="4400" dirty="0"/>
           </a:p>
@@ -16938,27 +16796,28 @@
         </p:nvSpPr>
         <p:spPr/>
         <p:txBody>
-          <a:bodyPr/>
-          <a:lstStyle/>
-          <a:p>
-            <a:r>
-              <a:rPr lang="sv-SE" sz="3600" dirty="0" smtClean="0"/>
+          <a:bodyPr>
+            <a:normAutofit/>
+          </a:bodyPr>
+          <a:lstStyle/>
+          <a:p>
+            <a:r>
+              <a:rPr lang="sv-SE" sz="4800" dirty="0" smtClean="0"/>
               <a:t>PA – Patrik Jansson</a:t>
             </a:r>
-            <a:endParaRPr lang="sv-SE" sz="3600" dirty="0" smtClean="0"/>
-          </a:p>
-          <a:p>
-            <a:r>
-              <a:rPr lang="sv-SE" sz="3600" dirty="0" err="1" smtClean="0"/>
+          </a:p>
+          <a:p>
+            <a:r>
+              <a:rPr lang="sv-SE" sz="4800" dirty="0" err="1" smtClean="0"/>
               <a:t>DSLsofMath</a:t>
             </a:r>
             <a:r>
-              <a:rPr lang="sv-SE" sz="3600" dirty="0" smtClean="0"/>
+              <a:rPr lang="sv-SE" sz="4800" dirty="0" smtClean="0"/>
               <a:t> – Kurs</a:t>
             </a:r>
           </a:p>
           <a:p>
-            <a:endParaRPr lang="sv-SE" dirty="0"/>
+            <a:endParaRPr lang="sv-SE" sz="3600" dirty="0"/>
           </a:p>
         </p:txBody>
       </p:sp>

</xml_diff>